<commit_message>
Revert "Some text aliged"
This reverts commit a54a2fb7af6ff1f0c6ce8dd05e74ab9fc694bd82.
</commit_message>
<xml_diff>
--- a/Project Idea.pptx
+++ b/Project Idea.pptx
@@ -6120,6 +6120,10 @@
               <a:rPr lang="en-US" sz="4000" dirty="0"/>
               <a:t>CSE299–Junior Design</a:t>
             </a:r>
+            <a:r>
+              <a:rPr lang="en-US" dirty="0"/>
+              <a:t/>
+            </a:r>
             <a:br>
               <a:rPr lang="en-US" dirty="0"/>
             </a:br>
@@ -6240,22 +6244,39 @@
             </a:r>
             <a:r>
               <a:rPr lang="en-US" dirty="0"/>
-              <a:t> – 1620044062</a:t>
-            </a:r>
-          </a:p>
-          <a:p>
+              <a:t> </a:t>
+            </a:r>
+            <a:r>
+              <a:rPr lang="en-US" dirty="0" smtClean="0"/>
+              <a:t>– 1620044062</a:t>
+            </a:r>
+          </a:p>
+          <a:p>
+            <a:r>
+              <a:rPr lang="en-US" dirty="0" smtClean="0"/>
+              <a:t>Md. </a:t>
+            </a:r>
+            <a:r>
+              <a:rPr lang="en-US" dirty="0" err="1" smtClean="0"/>
+              <a:t>Shafiqul</a:t>
+            </a:r>
+            <a:r>
+              <a:rPr lang="en-US" dirty="0" smtClean="0"/>
+              <a:t> Islam </a:t>
+            </a:r>
             <a:r>
               <a:rPr lang="en-US" dirty="0"/>
-              <a:t>Md. </a:t>
-            </a:r>
-            <a:r>
-              <a:rPr lang="en-US" dirty="0" err="1"/>
-              <a:t>Shafiqul</a:t>
+              <a:t>–</a:t>
+            </a:r>
+            <a:r>
+              <a:rPr lang="en-US" dirty="0" smtClean="0"/>
+              <a:t> </a:t>
             </a:r>
             <a:r>
               <a:rPr lang="en-US" dirty="0"/>
-              <a:t> Islam – 1610786042</a:t>
-            </a:r>
+              <a:t>1610786042</a:t>
+            </a:r>
+            <a:endParaRPr lang="en-US" dirty="0"/>
           </a:p>
         </p:txBody>
       </p:sp>
@@ -6294,7 +6315,7 @@
           <p:cNvPr id="2" name="Title 1">
             <a:extLst>
               <a:ext uri="{FF2B5EF4-FFF2-40B4-BE49-F238E27FC236}">
-                <a16:creationId xmlns:a16="http://schemas.microsoft.com/office/drawing/2014/main" id="{EE621C6E-5F2F-4937-8865-C734D9453DA9}"/>
+                <a16:creationId xmlns="" xmlns:a16="http://schemas.microsoft.com/office/drawing/2014/main" id="{EE621C6E-5F2F-4937-8865-C734D9453DA9}"/>
               </a:ext>
             </a:extLst>
           </p:cNvPr>
@@ -6323,7 +6344,7 @@
           <p:cNvPr id="3" name="Content Placeholder 2">
             <a:extLst>
               <a:ext uri="{FF2B5EF4-FFF2-40B4-BE49-F238E27FC236}">
-                <a16:creationId xmlns:a16="http://schemas.microsoft.com/office/drawing/2014/main" id="{9B3291E1-A36B-46D7-A21B-323E368C741F}"/>
+                <a16:creationId xmlns="" xmlns:a16="http://schemas.microsoft.com/office/drawing/2014/main" id="{9B3291E1-A36B-46D7-A21B-323E368C741F}"/>
               </a:ext>
             </a:extLst>
           </p:cNvPr>
@@ -6390,7 +6411,7 @@
           <p:cNvPr id="2" name="Title 1">
             <a:extLst>
               <a:ext uri="{FF2B5EF4-FFF2-40B4-BE49-F238E27FC236}">
-                <a16:creationId xmlns:a16="http://schemas.microsoft.com/office/drawing/2014/main" id="{4C061A10-2833-452A-9105-DC825714EF23}"/>
+                <a16:creationId xmlns="" xmlns:a16="http://schemas.microsoft.com/office/drawing/2014/main" id="{4C061A10-2833-452A-9105-DC825714EF23}"/>
               </a:ext>
             </a:extLst>
           </p:cNvPr>
@@ -6419,7 +6440,7 @@
           <p:cNvPr id="3" name="Content Placeholder 2">
             <a:extLst>
               <a:ext uri="{FF2B5EF4-FFF2-40B4-BE49-F238E27FC236}">
-                <a16:creationId xmlns:a16="http://schemas.microsoft.com/office/drawing/2014/main" id="{F07FC772-8746-4F46-A37C-B27A432E6A14}"/>
+                <a16:creationId xmlns="" xmlns:a16="http://schemas.microsoft.com/office/drawing/2014/main" id="{F07FC772-8746-4F46-A37C-B27A432E6A14}"/>
               </a:ext>
             </a:extLst>
           </p:cNvPr>
@@ -6480,7 +6501,7 @@
           <p:cNvPr id="2" name="Title 1">
             <a:extLst>
               <a:ext uri="{FF2B5EF4-FFF2-40B4-BE49-F238E27FC236}">
-                <a16:creationId xmlns:a16="http://schemas.microsoft.com/office/drawing/2014/main" id="{44E7957F-22C1-4E47-8B7C-6805AB00636A}"/>
+                <a16:creationId xmlns="" xmlns:a16="http://schemas.microsoft.com/office/drawing/2014/main" id="{44E7957F-22C1-4E47-8B7C-6805AB00636A}"/>
               </a:ext>
             </a:extLst>
           </p:cNvPr>
@@ -6509,7 +6530,7 @@
           <p:cNvPr id="3" name="Content Placeholder 2">
             <a:extLst>
               <a:ext uri="{FF2B5EF4-FFF2-40B4-BE49-F238E27FC236}">
-                <a16:creationId xmlns:a16="http://schemas.microsoft.com/office/drawing/2014/main" id="{072A5E65-883A-45DC-A7B8-883AE75097C4}"/>
+                <a16:creationId xmlns="" xmlns:a16="http://schemas.microsoft.com/office/drawing/2014/main" id="{072A5E65-883A-45DC-A7B8-883AE75097C4}"/>
               </a:ext>
             </a:extLst>
           </p:cNvPr>
@@ -6621,7 +6642,7 @@
           <p:cNvPr id="2" name="Title 1">
             <a:extLst>
               <a:ext uri="{FF2B5EF4-FFF2-40B4-BE49-F238E27FC236}">
-                <a16:creationId xmlns:a16="http://schemas.microsoft.com/office/drawing/2014/main" id="{BB517D65-B75E-40C6-814F-AE2B01582EAA}"/>
+                <a16:creationId xmlns="" xmlns:a16="http://schemas.microsoft.com/office/drawing/2014/main" id="{BB517D65-B75E-40C6-814F-AE2B01582EAA}"/>
               </a:ext>
             </a:extLst>
           </p:cNvPr>
@@ -6655,7 +6676,7 @@
           <p:cNvPr id="3" name="Content Placeholder 2">
             <a:extLst>
               <a:ext uri="{FF2B5EF4-FFF2-40B4-BE49-F238E27FC236}">
-                <a16:creationId xmlns:a16="http://schemas.microsoft.com/office/drawing/2014/main" id="{31300AFC-5212-4E2A-8081-0E1FE354AF51}"/>
+                <a16:creationId xmlns="" xmlns:a16="http://schemas.microsoft.com/office/drawing/2014/main" id="{31300AFC-5212-4E2A-8081-0E1FE354AF51}"/>
               </a:ext>
             </a:extLst>
           </p:cNvPr>
@@ -6676,12 +6697,20 @@
           <a:bodyPr/>
           <a:lstStyle/>
           <a:p>
-            <a:pPr marL="0" indent="0" algn="just">
+            <a:pPr marL="0" indent="0">
               <a:buNone/>
             </a:pPr>
             <a:r>
+              <a:rPr lang="en-US" dirty="0" smtClean="0"/>
+              <a:t>This </a:t>
+            </a:r>
+            <a:r>
               <a:rPr lang="en-US" dirty="0"/>
-              <a:t>This project is not difficult to use, operate and understood by the users. Design of this project is pretty and responsive so that user won’t find it difficult to understand, use and navigate. This project provides the simplest system for managing pizza orders.</a:t>
+              <a:t>project is not difficult to use, operate and understood by the users. Design of this project is pretty and responsive so that user won’t find it difficult to understand, use and navigate. This project provides the simplest system for managing </a:t>
+            </a:r>
+            <a:r>
+              <a:rPr lang="en-US" dirty="0" smtClean="0"/>
+              <a:t>pizza orders.</a:t>
             </a:r>
           </a:p>
           <a:p>
@@ -6694,16 +6723,17 @@
             <a:pPr marL="0" indent="0" algn="ctr">
               <a:buNone/>
             </a:pPr>
+            <a:endParaRPr lang="en-US" sz="4000" dirty="0" smtClean="0"/>
+          </a:p>
+          <a:p>
+            <a:pPr marL="0" indent="0" algn="ctr">
+              <a:buNone/>
+            </a:pPr>
+            <a:r>
+              <a:rPr lang="en-US" sz="4000" dirty="0" smtClean="0"/>
+              <a:t>Thank You!!!</a:t>
+            </a:r>
             <a:endParaRPr lang="en-US" sz="4000" dirty="0"/>
-          </a:p>
-          <a:p>
-            <a:pPr marL="0" indent="0" algn="ctr">
-              <a:buNone/>
-            </a:pPr>
-            <a:r>
-              <a:rPr lang="en-US" sz="4000" dirty="0"/>
-              <a:t>Thank You!!!</a:t>
-            </a:r>
           </a:p>
         </p:txBody>
       </p:sp>

</xml_diff>

<commit_message>
Revert "Revert "Some text aliged""
This reverts commit b04a027d1b56247afb1f2dcf8c690529c0f00587.
</commit_message>
<xml_diff>
--- a/Project Idea.pptx
+++ b/Project Idea.pptx
@@ -6120,10 +6120,6 @@
               <a:rPr lang="en-US" sz="4000" dirty="0"/>
               <a:t>CSE299–Junior Design</a:t>
             </a:r>
-            <a:r>
-              <a:rPr lang="en-US" dirty="0"/>
-              <a:t/>
-            </a:r>
             <a:br>
               <a:rPr lang="en-US" dirty="0"/>
             </a:br>
@@ -6244,39 +6240,22 @@
             </a:r>
             <a:r>
               <a:rPr lang="en-US" dirty="0"/>
-              <a:t> </a:t>
-            </a:r>
-            <a:r>
-              <a:rPr lang="en-US" dirty="0" smtClean="0"/>
-              <a:t>– 1620044062</a:t>
-            </a:r>
-          </a:p>
-          <a:p>
-            <a:r>
-              <a:rPr lang="en-US" dirty="0" smtClean="0"/>
+              <a:t> – 1620044062</a:t>
+            </a:r>
+          </a:p>
+          <a:p>
+            <a:r>
+              <a:rPr lang="en-US" dirty="0"/>
               <a:t>Md. </a:t>
             </a:r>
             <a:r>
-              <a:rPr lang="en-US" dirty="0" err="1" smtClean="0"/>
+              <a:rPr lang="en-US" dirty="0" err="1"/>
               <a:t>Shafiqul</a:t>
             </a:r>
             <a:r>
-              <a:rPr lang="en-US" dirty="0" smtClean="0"/>
-              <a:t> Islam </a:t>
-            </a:r>
-            <a:r>
               <a:rPr lang="en-US" dirty="0"/>
-              <a:t>–</a:t>
-            </a:r>
-            <a:r>
-              <a:rPr lang="en-US" dirty="0" smtClean="0"/>
-              <a:t> </a:t>
-            </a:r>
-            <a:r>
-              <a:rPr lang="en-US" dirty="0"/>
-              <a:t>1610786042</a:t>
-            </a:r>
-            <a:endParaRPr lang="en-US" dirty="0"/>
+              <a:t> Islam – 1610786042</a:t>
+            </a:r>
           </a:p>
         </p:txBody>
       </p:sp>
@@ -6315,7 +6294,7 @@
           <p:cNvPr id="2" name="Title 1">
             <a:extLst>
               <a:ext uri="{FF2B5EF4-FFF2-40B4-BE49-F238E27FC236}">
-                <a16:creationId xmlns="" xmlns:a16="http://schemas.microsoft.com/office/drawing/2014/main" id="{EE621C6E-5F2F-4937-8865-C734D9453DA9}"/>
+                <a16:creationId xmlns:a16="http://schemas.microsoft.com/office/drawing/2014/main" id="{EE621C6E-5F2F-4937-8865-C734D9453DA9}"/>
               </a:ext>
             </a:extLst>
           </p:cNvPr>
@@ -6344,7 +6323,7 @@
           <p:cNvPr id="3" name="Content Placeholder 2">
             <a:extLst>
               <a:ext uri="{FF2B5EF4-FFF2-40B4-BE49-F238E27FC236}">
-                <a16:creationId xmlns="" xmlns:a16="http://schemas.microsoft.com/office/drawing/2014/main" id="{9B3291E1-A36B-46D7-A21B-323E368C741F}"/>
+                <a16:creationId xmlns:a16="http://schemas.microsoft.com/office/drawing/2014/main" id="{9B3291E1-A36B-46D7-A21B-323E368C741F}"/>
               </a:ext>
             </a:extLst>
           </p:cNvPr>
@@ -6411,7 +6390,7 @@
           <p:cNvPr id="2" name="Title 1">
             <a:extLst>
               <a:ext uri="{FF2B5EF4-FFF2-40B4-BE49-F238E27FC236}">
-                <a16:creationId xmlns="" xmlns:a16="http://schemas.microsoft.com/office/drawing/2014/main" id="{4C061A10-2833-452A-9105-DC825714EF23}"/>
+                <a16:creationId xmlns:a16="http://schemas.microsoft.com/office/drawing/2014/main" id="{4C061A10-2833-452A-9105-DC825714EF23}"/>
               </a:ext>
             </a:extLst>
           </p:cNvPr>
@@ -6440,7 +6419,7 @@
           <p:cNvPr id="3" name="Content Placeholder 2">
             <a:extLst>
               <a:ext uri="{FF2B5EF4-FFF2-40B4-BE49-F238E27FC236}">
-                <a16:creationId xmlns="" xmlns:a16="http://schemas.microsoft.com/office/drawing/2014/main" id="{F07FC772-8746-4F46-A37C-B27A432E6A14}"/>
+                <a16:creationId xmlns:a16="http://schemas.microsoft.com/office/drawing/2014/main" id="{F07FC772-8746-4F46-A37C-B27A432E6A14}"/>
               </a:ext>
             </a:extLst>
           </p:cNvPr>
@@ -6501,7 +6480,7 @@
           <p:cNvPr id="2" name="Title 1">
             <a:extLst>
               <a:ext uri="{FF2B5EF4-FFF2-40B4-BE49-F238E27FC236}">
-                <a16:creationId xmlns="" xmlns:a16="http://schemas.microsoft.com/office/drawing/2014/main" id="{44E7957F-22C1-4E47-8B7C-6805AB00636A}"/>
+                <a16:creationId xmlns:a16="http://schemas.microsoft.com/office/drawing/2014/main" id="{44E7957F-22C1-4E47-8B7C-6805AB00636A}"/>
               </a:ext>
             </a:extLst>
           </p:cNvPr>
@@ -6530,7 +6509,7 @@
           <p:cNvPr id="3" name="Content Placeholder 2">
             <a:extLst>
               <a:ext uri="{FF2B5EF4-FFF2-40B4-BE49-F238E27FC236}">
-                <a16:creationId xmlns="" xmlns:a16="http://schemas.microsoft.com/office/drawing/2014/main" id="{072A5E65-883A-45DC-A7B8-883AE75097C4}"/>
+                <a16:creationId xmlns:a16="http://schemas.microsoft.com/office/drawing/2014/main" id="{072A5E65-883A-45DC-A7B8-883AE75097C4}"/>
               </a:ext>
             </a:extLst>
           </p:cNvPr>
@@ -6642,7 +6621,7 @@
           <p:cNvPr id="2" name="Title 1">
             <a:extLst>
               <a:ext uri="{FF2B5EF4-FFF2-40B4-BE49-F238E27FC236}">
-                <a16:creationId xmlns="" xmlns:a16="http://schemas.microsoft.com/office/drawing/2014/main" id="{BB517D65-B75E-40C6-814F-AE2B01582EAA}"/>
+                <a16:creationId xmlns:a16="http://schemas.microsoft.com/office/drawing/2014/main" id="{BB517D65-B75E-40C6-814F-AE2B01582EAA}"/>
               </a:ext>
             </a:extLst>
           </p:cNvPr>
@@ -6676,7 +6655,7 @@
           <p:cNvPr id="3" name="Content Placeholder 2">
             <a:extLst>
               <a:ext uri="{FF2B5EF4-FFF2-40B4-BE49-F238E27FC236}">
-                <a16:creationId xmlns="" xmlns:a16="http://schemas.microsoft.com/office/drawing/2014/main" id="{31300AFC-5212-4E2A-8081-0E1FE354AF51}"/>
+                <a16:creationId xmlns:a16="http://schemas.microsoft.com/office/drawing/2014/main" id="{31300AFC-5212-4E2A-8081-0E1FE354AF51}"/>
               </a:ext>
             </a:extLst>
           </p:cNvPr>
@@ -6697,20 +6676,12 @@
           <a:bodyPr/>
           <a:lstStyle/>
           <a:p>
-            <a:pPr marL="0" indent="0">
+            <a:pPr marL="0" indent="0" algn="just">
               <a:buNone/>
             </a:pPr>
             <a:r>
-              <a:rPr lang="en-US" dirty="0" smtClean="0"/>
-              <a:t>This </a:t>
-            </a:r>
-            <a:r>
               <a:rPr lang="en-US" dirty="0"/>
-              <a:t>project is not difficult to use, operate and understood by the users. Design of this project is pretty and responsive so that user won’t find it difficult to understand, use and navigate. This project provides the simplest system for managing </a:t>
-            </a:r>
-            <a:r>
-              <a:rPr lang="en-US" dirty="0" smtClean="0"/>
-              <a:t>pizza orders.</a:t>
+              <a:t>This project is not difficult to use, operate and understood by the users. Design of this project is pretty and responsive so that user won’t find it difficult to understand, use and navigate. This project provides the simplest system for managing pizza orders.</a:t>
             </a:r>
           </a:p>
           <a:p>
@@ -6723,17 +6694,16 @@
             <a:pPr marL="0" indent="0" algn="ctr">
               <a:buNone/>
             </a:pPr>
-            <a:endParaRPr lang="en-US" sz="4000" dirty="0" smtClean="0"/>
+            <a:endParaRPr lang="en-US" sz="4000" dirty="0"/>
           </a:p>
           <a:p>
             <a:pPr marL="0" indent="0" algn="ctr">
               <a:buNone/>
             </a:pPr>
             <a:r>
-              <a:rPr lang="en-US" sz="4000" dirty="0" smtClean="0"/>
+              <a:rPr lang="en-US" sz="4000" dirty="0"/>
               <a:t>Thank You!!!</a:t>
             </a:r>
-            <a:endParaRPr lang="en-US" sz="4000" dirty="0"/>
           </a:p>
         </p:txBody>
       </p:sp>

</xml_diff>